<commit_message>
Julian imporvements and GQM plan added
</commit_message>
<xml_diff>
--- a/Proposal Vortrag/Präsi.pptx
+++ b/Proposal Vortrag/Präsi.pptx
@@ -15173,13 +15173,13 @@
           <a:p>
             <a:r>
               <a:rPr lang="en-US" altLang="de-DE" dirty="0"/>
-              <a:t>Create separate cluster while using dependencies</a:t>
+              <a:t>Create separate clusters by using the dependencies as weights</a:t>
             </a:r>
           </a:p>
           <a:p>
             <a:r>
               <a:rPr lang="en-US" altLang="de-DE" dirty="0"/>
-              <a:t>Match clusters to generate possible microservice candidates</a:t>
+              <a:t>Match set of clusters to generate possible microservice candidates</a:t>
             </a:r>
           </a:p>
         </p:txBody>
@@ -17563,6 +17563,13 @@
             <a:r>
               <a:rPr lang="en-US" altLang="de-DE" dirty="0"/>
               <a:t>Use most adequate strategy from RQ1 as basis for new approach</a:t>
+            </a:r>
+          </a:p>
+          <a:p>
+            <a:pPr lvl="1"/>
+            <a:r>
+              <a:rPr lang="en-US" altLang="de-DE" dirty="0"/>
+              <a:t>Elaborate new approach</a:t>
             </a:r>
           </a:p>
           <a:p>

</xml_diff>